<commit_message>
filled out form and tweaked one sentence of poster
</commit_message>
<xml_diff>
--- a/conference/Will MPA 2019.pptx
+++ b/conference/Will MPA 2019.pptx
@@ -148,7 +148,7 @@
   </p:defaultTextStyle>
   <p:extLst>
     <p:ext uri="{EFAFB233-063F-42B5-8137-9DF3F51BA10A}">
-      <p15:sldGuideLst xmlns:p15="http://schemas.microsoft.com/office/powerpoint/2012/main">
+      <p15:sldGuideLst xmlns:p15="http://schemas.microsoft.com/office/powerpoint/2012/main" xmlns="">
         <p15:guide id="1" orient="horz" pos="10368">
           <p15:clr>
             <a:srgbClr val="A4A3A4"/>
@@ -357,7 +357,7 @@
             <a:fld id="{FD943D7A-167B-4D1B-8238-B31E320746FF}" type="datetimeFigureOut">
               <a:rPr lang="en-US"/>
               <a:pPr/>
-              <a:t>4/1/19</a:t>
+              <a:t>4/2/19</a:t>
             </a:fld>
             <a:endParaRPr lang="en-US"/>
           </a:p>
@@ -841,7 +841,7 @@
           <a:p>
             <a:fld id="{663379F8-D3CD-4F84-8ABE-D8B7DBD32689}" type="datetimeFigureOut">
               <a:rPr lang="en-US" smtClean="0"/>
-              <a:t>4/1/19</a:t>
+              <a:t>4/2/19</a:t>
             </a:fld>
             <a:endParaRPr lang="en-US"/>
           </a:p>
@@ -1012,7 +1012,7 @@
           <a:p>
             <a:fld id="{663379F8-D3CD-4F84-8ABE-D8B7DBD32689}" type="datetimeFigureOut">
               <a:rPr lang="en-US" smtClean="0"/>
-              <a:t>4/1/19</a:t>
+              <a:t>4/2/19</a:t>
             </a:fld>
             <a:endParaRPr lang="en-US"/>
           </a:p>
@@ -1193,7 +1193,7 @@
           <a:p>
             <a:fld id="{663379F8-D3CD-4F84-8ABE-D8B7DBD32689}" type="datetimeFigureOut">
               <a:rPr lang="en-US" smtClean="0"/>
-              <a:t>4/1/19</a:t>
+              <a:t>4/2/19</a:t>
             </a:fld>
             <a:endParaRPr lang="en-US"/>
           </a:p>
@@ -1364,7 +1364,7 @@
           <a:p>
             <a:fld id="{663379F8-D3CD-4F84-8ABE-D8B7DBD32689}" type="datetimeFigureOut">
               <a:rPr lang="en-US" smtClean="0"/>
-              <a:t>4/1/19</a:t>
+              <a:t>4/2/19</a:t>
             </a:fld>
             <a:endParaRPr lang="en-US"/>
           </a:p>
@@ -1609,7 +1609,7 @@
           <a:p>
             <a:fld id="{663379F8-D3CD-4F84-8ABE-D8B7DBD32689}" type="datetimeFigureOut">
               <a:rPr lang="en-US" smtClean="0"/>
-              <a:t>4/1/19</a:t>
+              <a:t>4/2/19</a:t>
             </a:fld>
             <a:endParaRPr lang="en-US"/>
           </a:p>
@@ -1842,7 +1842,7 @@
           <a:p>
             <a:fld id="{663379F8-D3CD-4F84-8ABE-D8B7DBD32689}" type="datetimeFigureOut">
               <a:rPr lang="en-US" smtClean="0"/>
-              <a:t>4/1/19</a:t>
+              <a:t>4/2/19</a:t>
             </a:fld>
             <a:endParaRPr lang="en-US"/>
           </a:p>
@@ -2210,7 +2210,7 @@
           <a:p>
             <a:fld id="{663379F8-D3CD-4F84-8ABE-D8B7DBD32689}" type="datetimeFigureOut">
               <a:rPr lang="en-US" smtClean="0"/>
-              <a:t>4/1/19</a:t>
+              <a:t>4/2/19</a:t>
             </a:fld>
             <a:endParaRPr lang="en-US"/>
           </a:p>
@@ -2329,7 +2329,7 @@
           <a:p>
             <a:fld id="{663379F8-D3CD-4F84-8ABE-D8B7DBD32689}" type="datetimeFigureOut">
               <a:rPr lang="en-US" smtClean="0"/>
-              <a:t>4/1/19</a:t>
+              <a:t>4/2/19</a:t>
             </a:fld>
             <a:endParaRPr lang="en-US"/>
           </a:p>
@@ -2425,7 +2425,7 @@
           <a:p>
             <a:fld id="{663379F8-D3CD-4F84-8ABE-D8B7DBD32689}" type="datetimeFigureOut">
               <a:rPr lang="en-US" smtClean="0"/>
-              <a:t>4/1/19</a:t>
+              <a:t>4/2/19</a:t>
             </a:fld>
             <a:endParaRPr lang="en-US"/>
           </a:p>
@@ -2703,7 +2703,7 @@
           <a:p>
             <a:fld id="{663379F8-D3CD-4F84-8ABE-D8B7DBD32689}" type="datetimeFigureOut">
               <a:rPr lang="en-US" smtClean="0"/>
-              <a:t>4/1/19</a:t>
+              <a:t>4/2/19</a:t>
             </a:fld>
             <a:endParaRPr lang="en-US"/>
           </a:p>
@@ -2961,7 +2961,7 @@
           <a:p>
             <a:fld id="{663379F8-D3CD-4F84-8ABE-D8B7DBD32689}" type="datetimeFigureOut">
               <a:rPr lang="en-US" smtClean="0"/>
-              <a:t>4/1/19</a:t>
+              <a:t>4/2/19</a:t>
             </a:fld>
             <a:endParaRPr lang="en-US"/>
           </a:p>
@@ -3175,7 +3175,7 @@
           <a:p>
             <a:fld id="{663379F8-D3CD-4F84-8ABE-D8B7DBD32689}" type="datetimeFigureOut">
               <a:rPr lang="en-US" smtClean="0"/>
-              <a:t>4/1/19</a:t>
+              <a:t>4/2/19</a:t>
             </a:fld>
             <a:endParaRPr lang="en-US"/>
           </a:p>
@@ -3845,7 +3845,7 @@
           </a:ln>
           <a:extLst>
             <a:ext uri="{909E8E84-426E-40dd-AFC4-6F175D3DCCD1}">
-              <a14:hiddenFill xmlns:a14="http://schemas.microsoft.com/office/drawing/2010/main" xmlns="">
+              <a14:hiddenFill xmlns:a14="http://schemas.microsoft.com/office/drawing/2010/main">
                 <a:noFill/>
               </a14:hiddenFill>
             </a:ext>
@@ -3895,7 +3895,7 @@
           </a:ln>
           <a:extLst>
             <a:ext uri="{909E8E84-426E-40dd-AFC4-6F175D3DCCD1}">
-              <a14:hiddenFill xmlns:a14="http://schemas.microsoft.com/office/drawing/2010/main" xmlns="">
+              <a14:hiddenFill xmlns:a14="http://schemas.microsoft.com/office/drawing/2010/main">
                 <a:noFill/>
               </a14:hiddenFill>
             </a:ext>
@@ -3945,7 +3945,7 @@
           </a:ln>
           <a:extLst>
             <a:ext uri="{909E8E84-426E-40dd-AFC4-6F175D3DCCD1}">
-              <a14:hiddenFill xmlns:a14="http://schemas.microsoft.com/office/drawing/2010/main" xmlns="">
+              <a14:hiddenFill xmlns:a14="http://schemas.microsoft.com/office/drawing/2010/main">
                 <a:noFill/>
               </a14:hiddenFill>
             </a:ext>
@@ -3995,14 +3995,14 @@
           </a:ln>
           <a:extLst>
             <a:ext uri="{909E8E84-426E-40dd-AFC4-6F175D3DCCD1}">
-              <a14:hiddenFill xmlns:a14="http://schemas.microsoft.com/office/drawing/2010/main" xmlns="">
+              <a14:hiddenFill xmlns:a14="http://schemas.microsoft.com/office/drawing/2010/main">
                 <a:solidFill>
                   <a:srgbClr val="FFFFFF"/>
                 </a:solidFill>
               </a14:hiddenFill>
             </a:ext>
             <a:ext uri="{91240B29-F687-4f45-9708-019B960494DF}">
-              <a14:hiddenLine xmlns:a14="http://schemas.microsoft.com/office/drawing/2010/main" xmlns="" w="12700" cap="rnd">
+              <a14:hiddenLine xmlns:a14="http://schemas.microsoft.com/office/drawing/2010/main" w="12700" cap="rnd">
                 <a:solidFill>
                   <a:schemeClr val="tx1"/>
                 </a:solidFill>
@@ -4198,14 +4198,14 @@
           </a:ln>
           <a:extLst>
             <a:ext uri="{909E8E84-426E-40dd-AFC4-6F175D3DCCD1}">
-              <a14:hiddenFill xmlns:a14="http://schemas.microsoft.com/office/drawing/2010/main" xmlns="">
+              <a14:hiddenFill xmlns:a14="http://schemas.microsoft.com/office/drawing/2010/main">
                 <a:solidFill>
                   <a:srgbClr val="FFFFFF"/>
                 </a:solidFill>
               </a14:hiddenFill>
             </a:ext>
             <a:ext uri="{91240B29-F687-4f45-9708-019B960494DF}">
-              <a14:hiddenLine xmlns:a14="http://schemas.microsoft.com/office/drawing/2010/main" xmlns="" w="12700" cap="rnd">
+              <a14:hiddenLine xmlns:a14="http://schemas.microsoft.com/office/drawing/2010/main" w="12700" cap="rnd">
                 <a:solidFill>
                   <a:schemeClr val="tx1"/>
                 </a:solidFill>
@@ -4378,14 +4378,14 @@
           </a:ln>
           <a:extLst>
             <a:ext uri="{909E8E84-426E-40dd-AFC4-6F175D3DCCD1}">
-              <a14:hiddenFill xmlns:a14="http://schemas.microsoft.com/office/drawing/2010/main" xmlns="">
+              <a14:hiddenFill xmlns:a14="http://schemas.microsoft.com/office/drawing/2010/main">
                 <a:solidFill>
                   <a:srgbClr val="FFFFFF"/>
                 </a:solidFill>
               </a14:hiddenFill>
             </a:ext>
             <a:ext uri="{91240B29-F687-4f45-9708-019B960494DF}">
-              <a14:hiddenLine xmlns:a14="http://schemas.microsoft.com/office/drawing/2010/main" xmlns="" w="12700" cap="rnd">
+              <a14:hiddenLine xmlns:a14="http://schemas.microsoft.com/office/drawing/2010/main" w="12700" cap="rnd">
                 <a:solidFill>
                   <a:schemeClr val="tx1"/>
                 </a:solidFill>
@@ -5269,14 +5269,14 @@
           </a:ln>
           <a:extLst>
             <a:ext uri="{909E8E84-426E-40dd-AFC4-6F175D3DCCD1}">
-              <a14:hiddenFill xmlns:a14="http://schemas.microsoft.com/office/drawing/2010/main" xmlns="">
+              <a14:hiddenFill xmlns:a14="http://schemas.microsoft.com/office/drawing/2010/main">
                 <a:solidFill>
                   <a:srgbClr val="FFFFFF"/>
                 </a:solidFill>
               </a14:hiddenFill>
             </a:ext>
             <a:ext uri="{91240B29-F687-4f45-9708-019B960494DF}">
-              <a14:hiddenLine xmlns:a14="http://schemas.microsoft.com/office/drawing/2010/main" xmlns="" w="12700" cap="rnd">
+              <a14:hiddenLine xmlns:a14="http://schemas.microsoft.com/office/drawing/2010/main" w="12700" cap="rnd">
                 <a:solidFill>
                   <a:schemeClr val="tx1"/>
                 </a:solidFill>
@@ -5565,7 +5565,7 @@
           </a:ln>
           <a:extLst>
             <a:ext uri="{909E8E84-426E-40dd-AFC4-6F175D3DCCD1}">
-              <a14:hiddenFill xmlns:a14="http://schemas.microsoft.com/office/drawing/2010/main" xmlns="">
+              <a14:hiddenFill xmlns:a14="http://schemas.microsoft.com/office/drawing/2010/main">
                 <a:noFill/>
               </a14:hiddenFill>
             </a:ext>
@@ -5615,7 +5615,7 @@
           </a:ln>
           <a:extLst>
             <a:ext uri="{909E8E84-426E-40dd-AFC4-6F175D3DCCD1}">
-              <a14:hiddenFill xmlns:a14="http://schemas.microsoft.com/office/drawing/2010/main" xmlns="">
+              <a14:hiddenFill xmlns:a14="http://schemas.microsoft.com/office/drawing/2010/main">
                 <a:noFill/>
               </a14:hiddenFill>
             </a:ext>
@@ -5843,7 +5843,7 @@
         <p:spPr>
           <a:xfrm>
             <a:off x="15849600" y="10744200"/>
-            <a:ext cx="12344400" cy="3970318"/>
+            <a:ext cx="12344400" cy="5078314"/>
           </a:xfrm>
           <a:prstGeom prst="rect">
             <a:avLst/>
@@ -5870,8 +5870,21 @@
                 <a:ea typeface="Times New Roman" charset="0"/>
                 <a:cs typeface="Times New Roman" charset="0"/>
               </a:rPr>
-              <a:t>For mean and standard deviation values, ‘C’ and ‘L’ refer to ‘conservative’ and ‘liberal’ respectively. Given the values obtained, it became clear usage of MFD words was quite similar across the foundations regardless of political lean.</a:t>
-            </a:r>
+              <a:t>For mean and standard deviation values, ‘C’ and ‘L’ refer to ‘conservative’ and ‘liberal’ respectively. Given the values obtained, it became clear usage of MFD words was quite similar across the foundations regardless of political lean</a:t>
+            </a:r>
+            <a:r>
+              <a:rPr lang="en-US" sz="3600" dirty="0" smtClean="0">
+                <a:latin typeface="Times New Roman" charset="0"/>
+                <a:ea typeface="Times New Roman" charset="0"/>
+                <a:cs typeface="Times New Roman" charset="0"/>
+              </a:rPr>
+              <a:t>. The sign of the weighted mean score indicates directionality of endorsement for that moral foundation.</a:t>
+            </a:r>
+            <a:endParaRPr lang="en-US" sz="3600" dirty="0">
+              <a:latin typeface="Times New Roman" charset="0"/>
+              <a:ea typeface="Times New Roman" charset="0"/>
+              <a:cs typeface="Times New Roman" charset="0"/>
+            </a:endParaRPr>
           </a:p>
           <a:p>
             <a:endParaRPr lang="en-US" sz="3600" i="1" dirty="0">
@@ -6097,35 +6110,35 @@
                 <a:gridCol w="5037370">
                   <a:extLst>
                     <a:ext uri="{9D8B030D-6E8A-4147-A177-3AD203B41FA5}">
-                      <a16:colId xmlns:a16="http://schemas.microsoft.com/office/drawing/2014/main" val="20000"/>
+                      <a16:colId xmlns:a16="http://schemas.microsoft.com/office/drawing/2014/main" xmlns="" val="20000"/>
                     </a:ext>
                   </a:extLst>
                 </a:gridCol>
                 <a:gridCol w="1441364">
                   <a:extLst>
                     <a:ext uri="{9D8B030D-6E8A-4147-A177-3AD203B41FA5}">
-                      <a16:colId xmlns:a16="http://schemas.microsoft.com/office/drawing/2014/main" val="20001"/>
+                      <a16:colId xmlns:a16="http://schemas.microsoft.com/office/drawing/2014/main" xmlns="" val="20001"/>
                     </a:ext>
                   </a:extLst>
                 </a:gridCol>
                 <a:gridCol w="2430099">
                   <a:extLst>
                     <a:ext uri="{9D8B030D-6E8A-4147-A177-3AD203B41FA5}">
-                      <a16:colId xmlns:a16="http://schemas.microsoft.com/office/drawing/2014/main" val="20002"/>
+                      <a16:colId xmlns:a16="http://schemas.microsoft.com/office/drawing/2014/main" xmlns="" val="20002"/>
                     </a:ext>
                   </a:extLst>
                 </a:gridCol>
                 <a:gridCol w="1257730">
                   <a:extLst>
                     <a:ext uri="{9D8B030D-6E8A-4147-A177-3AD203B41FA5}">
-                      <a16:colId xmlns:a16="http://schemas.microsoft.com/office/drawing/2014/main" val="20003"/>
+                      <a16:colId xmlns:a16="http://schemas.microsoft.com/office/drawing/2014/main" xmlns="" val="20003"/>
                     </a:ext>
                   </a:extLst>
                 </a:gridCol>
                 <a:gridCol w="2031718">
                   <a:extLst>
                     <a:ext uri="{9D8B030D-6E8A-4147-A177-3AD203B41FA5}">
-                      <a16:colId xmlns:a16="http://schemas.microsoft.com/office/drawing/2014/main" val="20004"/>
+                      <a16:colId xmlns:a16="http://schemas.microsoft.com/office/drawing/2014/main" xmlns="" val="20004"/>
                     </a:ext>
                   </a:extLst>
                 </a:gridCol>
@@ -6381,7 +6394,7 @@
                 </a:tc>
                 <a:extLst>
                   <a:ext uri="{0D108BD9-81ED-4DB2-BD59-A6C34878D82A}">
-                    <a16:rowId xmlns:a16="http://schemas.microsoft.com/office/drawing/2014/main" val="10000"/>
+                    <a16:rowId xmlns:a16="http://schemas.microsoft.com/office/drawing/2014/main" xmlns="" val="10000"/>
                   </a:ext>
                 </a:extLst>
               </a:tr>
@@ -6547,7 +6560,7 @@
                 </a:tc>
                 <a:extLst>
                   <a:ext uri="{0D108BD9-81ED-4DB2-BD59-A6C34878D82A}">
-                    <a16:rowId xmlns:a16="http://schemas.microsoft.com/office/drawing/2014/main" val="10001"/>
+                    <a16:rowId xmlns:a16="http://schemas.microsoft.com/office/drawing/2014/main" xmlns="" val="10001"/>
                   </a:ext>
                 </a:extLst>
               </a:tr>
@@ -6668,7 +6681,7 @@
                 </a:tc>
                 <a:extLst>
                   <a:ext uri="{0D108BD9-81ED-4DB2-BD59-A6C34878D82A}">
-                    <a16:rowId xmlns:a16="http://schemas.microsoft.com/office/drawing/2014/main" val="10002"/>
+                    <a16:rowId xmlns:a16="http://schemas.microsoft.com/office/drawing/2014/main" xmlns="" val="10002"/>
                   </a:ext>
                 </a:extLst>
               </a:tr>
@@ -6808,7 +6821,7 @@
                 </a:tc>
                 <a:extLst>
                   <a:ext uri="{0D108BD9-81ED-4DB2-BD59-A6C34878D82A}">
-                    <a16:rowId xmlns:a16="http://schemas.microsoft.com/office/drawing/2014/main" val="10003"/>
+                    <a16:rowId xmlns:a16="http://schemas.microsoft.com/office/drawing/2014/main" xmlns="" val="10003"/>
                   </a:ext>
                 </a:extLst>
               </a:tr>
@@ -6948,7 +6961,7 @@
                 </a:tc>
                 <a:extLst>
                   <a:ext uri="{0D108BD9-81ED-4DB2-BD59-A6C34878D82A}">
-                    <a16:rowId xmlns:a16="http://schemas.microsoft.com/office/drawing/2014/main" val="10004"/>
+                    <a16:rowId xmlns:a16="http://schemas.microsoft.com/office/drawing/2014/main" xmlns="" val="10004"/>
                   </a:ext>
                 </a:extLst>
               </a:tr>
@@ -7114,7 +7127,7 @@
                 </a:tc>
                 <a:extLst>
                   <a:ext uri="{0D108BD9-81ED-4DB2-BD59-A6C34878D82A}">
-                    <a16:rowId xmlns:a16="http://schemas.microsoft.com/office/drawing/2014/main" val="10005"/>
+                    <a16:rowId xmlns:a16="http://schemas.microsoft.com/office/drawing/2014/main" xmlns="" val="10005"/>
                   </a:ext>
                 </a:extLst>
               </a:tr>
@@ -7131,13 +7144,13 @@
           <p:nvPr>
             <p:extLst>
               <p:ext uri="{D42A27DB-BD31-4B8C-83A1-F6EECF244321}">
-                <p14:modId xmlns:p14="http://schemas.microsoft.com/office/powerpoint/2010/main" val="2104729952"/>
+                <p14:modId xmlns:p14="http://schemas.microsoft.com/office/powerpoint/2010/main" val="4037834223"/>
               </p:ext>
             </p:extLst>
           </p:nvPr>
         </p:nvGraphicFramePr>
         <p:xfrm>
-          <a:off x="15925801" y="14249400"/>
+          <a:off x="15925801" y="15361920"/>
           <a:ext cx="12191999" cy="3840480"/>
         </p:xfrm>
         <a:graphic>
@@ -7150,28 +7163,28 @@
                 <a:gridCol w="4097370">
                   <a:extLst>
                     <a:ext uri="{9D8B030D-6E8A-4147-A177-3AD203B41FA5}">
-                      <a16:colId xmlns:a16="http://schemas.microsoft.com/office/drawing/2014/main" val="20000"/>
+                      <a16:colId xmlns:a16="http://schemas.microsoft.com/office/drawing/2014/main" xmlns="" val="20000"/>
                     </a:ext>
                   </a:extLst>
                 </a:gridCol>
                 <a:gridCol w="2934294">
                   <a:extLst>
                     <a:ext uri="{9D8B030D-6E8A-4147-A177-3AD203B41FA5}">
-                      <a16:colId xmlns:a16="http://schemas.microsoft.com/office/drawing/2014/main" val="20001"/>
+                      <a16:colId xmlns:a16="http://schemas.microsoft.com/office/drawing/2014/main" xmlns="" val="20001"/>
                     </a:ext>
                   </a:extLst>
                 </a:gridCol>
                 <a:gridCol w="2934294">
                   <a:extLst>
                     <a:ext uri="{9D8B030D-6E8A-4147-A177-3AD203B41FA5}">
-                      <a16:colId xmlns:a16="http://schemas.microsoft.com/office/drawing/2014/main" val="20002"/>
+                      <a16:colId xmlns:a16="http://schemas.microsoft.com/office/drawing/2014/main" xmlns="" val="20002"/>
                     </a:ext>
                   </a:extLst>
                 </a:gridCol>
                 <a:gridCol w="2226041">
                   <a:extLst>
                     <a:ext uri="{9D8B030D-6E8A-4147-A177-3AD203B41FA5}">
-                      <a16:colId xmlns:a16="http://schemas.microsoft.com/office/drawing/2014/main" val="20003"/>
+                      <a16:colId xmlns:a16="http://schemas.microsoft.com/office/drawing/2014/main" xmlns="" val="20003"/>
                     </a:ext>
                   </a:extLst>
                 </a:gridCol>
@@ -7342,7 +7355,7 @@
                 </a:tc>
                 <a:extLst>
                   <a:ext uri="{0D108BD9-81ED-4DB2-BD59-A6C34878D82A}">
-                    <a16:rowId xmlns:a16="http://schemas.microsoft.com/office/drawing/2014/main" val="10000"/>
+                    <a16:rowId xmlns:a16="http://schemas.microsoft.com/office/drawing/2014/main" xmlns="" val="10000"/>
                   </a:ext>
                 </a:extLst>
               </a:tr>
@@ -7476,7 +7489,7 @@
                 </a:tc>
                 <a:extLst>
                   <a:ext uri="{0D108BD9-81ED-4DB2-BD59-A6C34878D82A}">
-                    <a16:rowId xmlns:a16="http://schemas.microsoft.com/office/drawing/2014/main" val="10001"/>
+                    <a16:rowId xmlns:a16="http://schemas.microsoft.com/office/drawing/2014/main" xmlns="" val="10001"/>
                   </a:ext>
                 </a:extLst>
               </a:tr>
@@ -7574,7 +7587,7 @@
                 </a:tc>
                 <a:extLst>
                   <a:ext uri="{0D108BD9-81ED-4DB2-BD59-A6C34878D82A}">
-                    <a16:rowId xmlns:a16="http://schemas.microsoft.com/office/drawing/2014/main" val="10002"/>
+                    <a16:rowId xmlns:a16="http://schemas.microsoft.com/office/drawing/2014/main" xmlns="" val="10002"/>
                   </a:ext>
                 </a:extLst>
               </a:tr>
@@ -7683,7 +7696,7 @@
                 </a:tc>
                 <a:extLst>
                   <a:ext uri="{0D108BD9-81ED-4DB2-BD59-A6C34878D82A}">
-                    <a16:rowId xmlns:a16="http://schemas.microsoft.com/office/drawing/2014/main" val="10003"/>
+                    <a16:rowId xmlns:a16="http://schemas.microsoft.com/office/drawing/2014/main" xmlns="" val="10003"/>
                   </a:ext>
                 </a:extLst>
               </a:tr>
@@ -7781,7 +7794,7 @@
                 </a:tc>
                 <a:extLst>
                   <a:ext uri="{0D108BD9-81ED-4DB2-BD59-A6C34878D82A}">
-                    <a16:rowId xmlns:a16="http://schemas.microsoft.com/office/drawing/2014/main" val="10004"/>
+                    <a16:rowId xmlns:a16="http://schemas.microsoft.com/office/drawing/2014/main" xmlns="" val="10004"/>
                   </a:ext>
                 </a:extLst>
               </a:tr>
@@ -7915,7 +7928,7 @@
                 </a:tc>
                 <a:extLst>
                   <a:ext uri="{0D108BD9-81ED-4DB2-BD59-A6C34878D82A}">
-                    <a16:rowId xmlns:a16="http://schemas.microsoft.com/office/drawing/2014/main" val="10005"/>
+                    <a16:rowId xmlns:a16="http://schemas.microsoft.com/office/drawing/2014/main" xmlns="" val="10005"/>
                   </a:ext>
                 </a:extLst>
               </a:tr>
@@ -7931,8 +7944,8 @@
         </p:nvSpPr>
         <p:spPr>
           <a:xfrm>
-            <a:off x="15925800" y="18135600"/>
-            <a:ext cx="12344400" cy="4524316"/>
+            <a:off x="15925800" y="19291280"/>
+            <a:ext cx="12344400" cy="3416320"/>
           </a:xfrm>
           <a:prstGeom prst="rect">
             <a:avLst/>
@@ -7975,7 +7988,15 @@
                 <a:ea typeface="Times New Roman" charset="0"/>
                 <a:cs typeface="Times New Roman" charset="0"/>
               </a:rPr>
-              <a:t>, but in the opposite direction from what was expected. The sign of the weighted mean score indicates directionality of endorsement for that moral foundation.</a:t>
+              <a:t>, but in the opposite direction from what was expected</a:t>
+            </a:r>
+            <a:r>
+              <a:rPr lang="en-US" sz="3600" dirty="0" smtClean="0">
+                <a:latin typeface="Times New Roman" charset="0"/>
+                <a:ea typeface="Times New Roman" charset="0"/>
+                <a:cs typeface="Times New Roman" charset="0"/>
+              </a:rPr>
+              <a:t>.</a:t>
             </a:r>
           </a:p>
           <a:p>
@@ -8025,35 +8046,35 @@
                 <a:gridCol w="3023887">
                   <a:extLst>
                     <a:ext uri="{9D8B030D-6E8A-4147-A177-3AD203B41FA5}">
-                      <a16:colId xmlns:a16="http://schemas.microsoft.com/office/drawing/2014/main" val="20000"/>
+                      <a16:colId xmlns:a16="http://schemas.microsoft.com/office/drawing/2014/main" xmlns="" val="20000"/>
                     </a:ext>
                   </a:extLst>
                 </a:gridCol>
                 <a:gridCol w="1658905">
                   <a:extLst>
                     <a:ext uri="{9D8B030D-6E8A-4147-A177-3AD203B41FA5}">
-                      <a16:colId xmlns:a16="http://schemas.microsoft.com/office/drawing/2014/main" val="20001"/>
+                      <a16:colId xmlns:a16="http://schemas.microsoft.com/office/drawing/2014/main" xmlns="" val="20001"/>
                     </a:ext>
                   </a:extLst>
                 </a:gridCol>
                 <a:gridCol w="2119498">
                   <a:extLst>
                     <a:ext uri="{9D8B030D-6E8A-4147-A177-3AD203B41FA5}">
-                      <a16:colId xmlns:a16="http://schemas.microsoft.com/office/drawing/2014/main" val="20002"/>
+                      <a16:colId xmlns:a16="http://schemas.microsoft.com/office/drawing/2014/main" xmlns="" val="20002"/>
                     </a:ext>
                   </a:extLst>
                 </a:gridCol>
                 <a:gridCol w="1894325">
                   <a:extLst>
                     <a:ext uri="{9D8B030D-6E8A-4147-A177-3AD203B41FA5}">
-                      <a16:colId xmlns:a16="http://schemas.microsoft.com/office/drawing/2014/main" val="20003"/>
+                      <a16:colId xmlns:a16="http://schemas.microsoft.com/office/drawing/2014/main" xmlns="" val="20003"/>
                     </a:ext>
                   </a:extLst>
                 </a:gridCol>
                 <a:gridCol w="3419183">
                   <a:extLst>
                     <a:ext uri="{9D8B030D-6E8A-4147-A177-3AD203B41FA5}">
-                      <a16:colId xmlns:a16="http://schemas.microsoft.com/office/drawing/2014/main" val="20004"/>
+                      <a16:colId xmlns:a16="http://schemas.microsoft.com/office/drawing/2014/main" xmlns="" val="20004"/>
                     </a:ext>
                   </a:extLst>
                 </a:gridCol>
@@ -8306,7 +8327,7 @@
                 </a:tc>
                 <a:extLst>
                   <a:ext uri="{0D108BD9-81ED-4DB2-BD59-A6C34878D82A}">
-                    <a16:rowId xmlns:a16="http://schemas.microsoft.com/office/drawing/2014/main" val="10000"/>
+                    <a16:rowId xmlns:a16="http://schemas.microsoft.com/office/drawing/2014/main" xmlns="" val="10000"/>
                   </a:ext>
                 </a:extLst>
               </a:tr>
@@ -8510,7 +8531,7 @@
                 </a:tc>
                 <a:extLst>
                   <a:ext uri="{0D108BD9-81ED-4DB2-BD59-A6C34878D82A}">
-                    <a16:rowId xmlns:a16="http://schemas.microsoft.com/office/drawing/2014/main" val="10001"/>
+                    <a16:rowId xmlns:a16="http://schemas.microsoft.com/office/drawing/2014/main" xmlns="" val="10001"/>
                   </a:ext>
                 </a:extLst>
               </a:tr>
@@ -8669,7 +8690,7 @@
                 </a:tc>
                 <a:extLst>
                   <a:ext uri="{0D108BD9-81ED-4DB2-BD59-A6C34878D82A}">
-                    <a16:rowId xmlns:a16="http://schemas.microsoft.com/office/drawing/2014/main" val="10002"/>
+                    <a16:rowId xmlns:a16="http://schemas.microsoft.com/office/drawing/2014/main" xmlns="" val="10002"/>
                   </a:ext>
                 </a:extLst>
               </a:tr>
@@ -8847,7 +8868,7 @@
                 </a:tc>
                 <a:extLst>
                   <a:ext uri="{0D108BD9-81ED-4DB2-BD59-A6C34878D82A}">
-                    <a16:rowId xmlns:a16="http://schemas.microsoft.com/office/drawing/2014/main" val="10003"/>
+                    <a16:rowId xmlns:a16="http://schemas.microsoft.com/office/drawing/2014/main" xmlns="" val="10003"/>
                   </a:ext>
                 </a:extLst>
               </a:tr>
@@ -9059,7 +9080,7 @@
                 </a:tc>
                 <a:extLst>
                   <a:ext uri="{0D108BD9-81ED-4DB2-BD59-A6C34878D82A}">
-                    <a16:rowId xmlns:a16="http://schemas.microsoft.com/office/drawing/2014/main" val="10004"/>
+                    <a16:rowId xmlns:a16="http://schemas.microsoft.com/office/drawing/2014/main" xmlns="" val="10004"/>
                   </a:ext>
                 </a:extLst>
               </a:tr>
@@ -9387,7 +9408,7 @@
   <a:extraClrSchemeLst/>
   <a:extLst>
     <a:ext uri="{05A4C25C-085E-4340-85A3-A5531E510DB2}">
-      <thm15:themeFamily xmlns:thm15="http://schemas.microsoft.com/office/thememl/2012/main" name="Office Theme" id="{62F939B6-93AF-4DB8-9C6B-D6C7DFDC589F}" vid="{AE6F2518-B084-4896-AF52-66CC2144AA26}"/>
+      <thm15:themeFamily xmlns:thm15="http://schemas.microsoft.com/office/thememl/2012/main" xmlns="" name="Office Theme" id="{62F939B6-93AF-4DB8-9C6B-D6C7DFDC589F}" vid="{AE6F2518-B084-4896-AF52-66CC2144AA26}"/>
     </a:ext>
   </a:extLst>
 </a:theme>
@@ -9648,7 +9669,7 @@
   <a:extraClrSchemeLst/>
   <a:extLst>
     <a:ext uri="{05A4C25C-085E-4340-85A3-A5531E510DB2}">
-      <thm15:themeFamily xmlns:thm15="http://schemas.microsoft.com/office/thememl/2012/main" name="Office Theme" id="{62F939B6-93AF-4DB8-9C6B-D6C7DFDC589F}" vid="{4A3C46E8-61CC-4603-A589-7422A47A8E4A}"/>
+      <thm15:themeFamily xmlns:thm15="http://schemas.microsoft.com/office/thememl/2012/main" xmlns="" name="Office Theme" id="{62F939B6-93AF-4DB8-9C6B-D6C7DFDC589F}" vid="{4A3C46E8-61CC-4603-A589-7422A47A8E4A}"/>
     </a:ext>
   </a:extLst>
 </a:theme>

</xml_diff>